<commit_message>
titel in der mitte
titel in der mitte

falls nicht gutn wieder zuurückändern
</commit_message>
<xml_diff>
--- a/Powerpoint.pptx
+++ b/Powerpoint.pptx
@@ -5251,6 +5251,7 @@
           <a:bodyPr/>
           <a:lstStyle/>
           <a:p>
+            <a:pPr algn="ctr"/>
             <a:r>
               <a:rPr lang="de-CH" dirty="0"/>
               <a:t>Podium</a:t>
@@ -5496,6 +5497,7 @@
           <a:bodyPr/>
           <a:lstStyle/>
           <a:p>
+            <a:pPr algn="ctr"/>
             <a:r>
               <a:rPr lang="de-CH" dirty="0"/>
               <a:t>Inhalt</a:t>
@@ -5985,6 +5987,7 @@
           <a:bodyPr/>
           <a:lstStyle/>
           <a:p>
+            <a:pPr algn="ctr"/>
             <a:r>
               <a:rPr lang="de-CH" dirty="0"/>
               <a:t>Rezeptionsgeschichte</a:t>
@@ -6154,6 +6157,7 @@
           <a:bodyPr/>
           <a:lstStyle/>
           <a:p>
+            <a:pPr algn="ctr"/>
             <a:r>
               <a:rPr lang="de-CH" dirty="0"/>
               <a:t>Figuren</a:t>

</xml_diff>